<commit_message>
Added additional slide to presentation
</commit_message>
<xml_diff>
--- a/presentation/Hookshot Heroes Presentation.pptx
+++ b/presentation/Hookshot Heroes Presentation.pptx
@@ -5,7 +5,7 @@
     <p:sldMasterId id="2147483648" r:id="rId1"/>
   </p:sldMasterIdLst>
   <p:notesMasterIdLst>
-    <p:notesMasterId r:id="rId13"/>
+    <p:notesMasterId r:id="rId14"/>
   </p:notesMasterIdLst>
   <p:sldIdLst>
     <p:sldId id="258" r:id="rId2"/>
@@ -18,7 +18,8 @@
     <p:sldId id="263" r:id="rId9"/>
     <p:sldId id="265" r:id="rId10"/>
     <p:sldId id="264" r:id="rId11"/>
-    <p:sldId id="266" r:id="rId12"/>
+    <p:sldId id="267" r:id="rId12"/>
+    <p:sldId id="266" r:id="rId13"/>
   </p:sldIdLst>
   <p:sldSz cx="12192000" cy="6858000"/>
   <p:notesSz cx="6858000" cy="9144000"/>
@@ -712,8 +713,20 @@
           <a:lstStyle/>
           <a:p>
             <a:r>
-              <a:rPr lang="en-US" dirty="0"/>
-              <a:t>Trailer</a:t>
+              <a:rPr lang="en-US" sz="1800" dirty="0"/>
+              <a:t>Voiceover: Additionally, the game was going to have a grapple that follows the players mouse, acting as a way to aim the grapple hook, 360 degrees. The grapple had to eventually be scaled down to being aimed with 4-directional movement (up, down, left, right) due to difficulties with implementation, and redundancy with the games grid-based level design. Furthermore, with the original concept heavily inspired by dungeons in the Legend of Zelda, there was consideration to add other elements to add to the diversity to the rooms the player could encounter such as lasers the player can redirect, boxes players can move, buttons, switches, and locked doors requiring speed and precision, allowing for different applications of the grapple hook. To deal with enemies, additions such as a shield </a:t>
+            </a:r>
+            <a:r>
+              <a:rPr lang="en-US" sz="1800"/>
+              <a:t>and sword </a:t>
+            </a:r>
+            <a:r>
+              <a:rPr lang="en-US" sz="1800" dirty="0"/>
+              <a:t>may also be useful in implement in </a:t>
+            </a:r>
+            <a:r>
+              <a:rPr lang="en-US" sz="1800"/>
+              <a:t>later iterations of the game.</a:t>
             </a:r>
             <a:endParaRPr lang="en-ID" dirty="0"/>
           </a:p>
@@ -737,6 +750,94 @@
             <a:fld id="{2B4D4FCE-0CAB-4554-980F-6AE5C2276E36}" type="slidenum">
               <a:rPr lang="en-ID" smtClean="0"/>
               <a:t>11</a:t>
+            </a:fld>
+            <a:endParaRPr lang="en-ID"/>
+          </a:p>
+        </p:txBody>
+      </p:sp>
+    </p:spTree>
+    <p:extLst>
+      <p:ext uri="{BB962C8B-B14F-4D97-AF65-F5344CB8AC3E}">
+        <p14:creationId xmlns:p14="http://schemas.microsoft.com/office/powerpoint/2010/main" val="3430200092"/>
+      </p:ext>
+    </p:extLst>
+  </p:cSld>
+  <p:clrMapOvr>
+    <a:masterClrMapping/>
+  </p:clrMapOvr>
+</p:notes>
+</file>
+
+<file path=ppt/notesSlides/notesSlide12.xml><?xml version="1.0" encoding="utf-8"?>
+<p:notes xmlns:a="http://schemas.openxmlformats.org/drawingml/2006/main" xmlns:r="http://schemas.openxmlformats.org/officeDocument/2006/relationships" xmlns:p="http://schemas.openxmlformats.org/presentationml/2006/main">
+  <p:cSld>
+    <p:spTree>
+      <p:nvGrpSpPr>
+        <p:cNvPr id="1" name=""/>
+        <p:cNvGrpSpPr/>
+        <p:nvPr/>
+      </p:nvGrpSpPr>
+      <p:grpSpPr>
+        <a:xfrm>
+          <a:off x="0" y="0"/>
+          <a:ext cx="0" cy="0"/>
+          <a:chOff x="0" y="0"/>
+          <a:chExt cx="0" cy="0"/>
+        </a:xfrm>
+      </p:grpSpPr>
+      <p:sp>
+        <p:nvSpPr>
+          <p:cNvPr id="2" name="Slide Image Placeholder 1"/>
+          <p:cNvSpPr>
+            <a:spLocks noGrp="1" noRot="1" noChangeAspect="1"/>
+          </p:cNvSpPr>
+          <p:nvPr>
+            <p:ph type="sldImg"/>
+          </p:nvPr>
+        </p:nvSpPr>
+        <p:spPr/>
+      </p:sp>
+      <p:sp>
+        <p:nvSpPr>
+          <p:cNvPr id="3" name="Notes Placeholder 2"/>
+          <p:cNvSpPr>
+            <a:spLocks noGrp="1"/>
+          </p:cNvSpPr>
+          <p:nvPr>
+            <p:ph type="body" idx="1"/>
+          </p:nvPr>
+        </p:nvSpPr>
+        <p:spPr/>
+        <p:txBody>
+          <a:bodyPr/>
+          <a:lstStyle/>
+          <a:p>
+            <a:r>
+              <a:rPr lang="en-US" dirty="0"/>
+              <a:t>Trailer</a:t>
+            </a:r>
+            <a:endParaRPr lang="en-ID" dirty="0"/>
+          </a:p>
+        </p:txBody>
+      </p:sp>
+      <p:sp>
+        <p:nvSpPr>
+          <p:cNvPr id="4" name="Slide Number Placeholder 3"/>
+          <p:cNvSpPr>
+            <a:spLocks noGrp="1"/>
+          </p:cNvSpPr>
+          <p:nvPr>
+            <p:ph type="sldNum" sz="quarter" idx="5"/>
+          </p:nvPr>
+        </p:nvSpPr>
+        <p:spPr/>
+        <p:txBody>
+          <a:bodyPr/>
+          <a:lstStyle/>
+          <a:p>
+            <a:fld id="{2B4D4FCE-0CAB-4554-980F-6AE5C2276E36}" type="slidenum">
+              <a:rPr lang="en-ID" smtClean="0"/>
+              <a:t>12</a:t>
             </a:fld>
             <a:endParaRPr lang="en-ID"/>
           </a:p>
@@ -5216,6 +5317,483 @@
         </p:blipFill>
         <p:spPr>
           <a:xfrm>
+            <a:off x="-94367" y="-8238"/>
+            <a:ext cx="12478068" cy="6866238"/>
+          </a:xfrm>
+          <a:prstGeom prst="rect">
+            <a:avLst/>
+          </a:prstGeom>
+        </p:spPr>
+      </p:pic>
+      <p:pic>
+        <p:nvPicPr>
+          <p:cNvPr id="4" name="Picture 3">
+            <a:extLst>
+              <a:ext uri="{FF2B5EF4-FFF2-40B4-BE49-F238E27FC236}">
+                <a16:creationId xmlns:a16="http://schemas.microsoft.com/office/drawing/2014/main" id="{9E401823-852D-D788-B3FA-07BEFCE31185}"/>
+              </a:ext>
+            </a:extLst>
+          </p:cNvPr>
+          <p:cNvPicPr>
+            <a:picLocks noChangeAspect="1"/>
+          </p:cNvPicPr>
+          <p:nvPr/>
+        </p:nvPicPr>
+        <p:blipFill>
+          <a:blip r:embed="rId4">
+            <a:extLst>
+              <a:ext uri="{28A0092B-C50C-407E-A947-70E740481C1C}">
+                <a14:useLocalDpi xmlns:a14="http://schemas.microsoft.com/office/drawing/2010/main" val="0"/>
+              </a:ext>
+            </a:extLst>
+          </a:blip>
+          <a:stretch>
+            <a:fillRect/>
+          </a:stretch>
+        </p:blipFill>
+        <p:spPr>
+          <a:xfrm>
+            <a:off x="1290918" y="960141"/>
+            <a:ext cx="3049435" cy="3033636"/>
+          </a:xfrm>
+          <a:prstGeom prst="rect">
+            <a:avLst/>
+          </a:prstGeom>
+          <a:ln w="38100">
+            <a:solidFill>
+              <a:schemeClr val="tx1"/>
+            </a:solidFill>
+          </a:ln>
+        </p:spPr>
+      </p:pic>
+      <p:pic>
+        <p:nvPicPr>
+          <p:cNvPr id="10" name="Picture 9" descr="A close-up of a dotted line&#10;&#10;Description automatically generated with low confidence">
+            <a:extLst>
+              <a:ext uri="{FF2B5EF4-FFF2-40B4-BE49-F238E27FC236}">
+                <a16:creationId xmlns:a16="http://schemas.microsoft.com/office/drawing/2014/main" id="{740C4093-0162-4154-4457-2CC4C85F7EF6}"/>
+              </a:ext>
+            </a:extLst>
+          </p:cNvPr>
+          <p:cNvPicPr>
+            <a:picLocks noChangeAspect="1"/>
+          </p:cNvPicPr>
+          <p:nvPr/>
+        </p:nvPicPr>
+        <p:blipFill>
+          <a:blip r:embed="rId5">
+            <a:extLst>
+              <a:ext uri="{28A0092B-C50C-407E-A947-70E740481C1C}">
+                <a14:useLocalDpi xmlns:a14="http://schemas.microsoft.com/office/drawing/2010/main" val="0"/>
+              </a:ext>
+            </a:extLst>
+          </a:blip>
+          <a:stretch>
+            <a:fillRect/>
+          </a:stretch>
+        </p:blipFill>
+        <p:spPr>
+          <a:xfrm>
+            <a:off x="1290918" y="4269441"/>
+            <a:ext cx="2777463" cy="1559739"/>
+          </a:xfrm>
+          <a:prstGeom prst="rect">
+            <a:avLst/>
+          </a:prstGeom>
+          <a:ln w="28575">
+            <a:solidFill>
+              <a:schemeClr val="tx1"/>
+            </a:solidFill>
+          </a:ln>
+        </p:spPr>
+      </p:pic>
+      <p:sp>
+        <p:nvSpPr>
+          <p:cNvPr id="11" name="TextBox 10">
+            <a:extLst>
+              <a:ext uri="{FF2B5EF4-FFF2-40B4-BE49-F238E27FC236}">
+                <a16:creationId xmlns:a16="http://schemas.microsoft.com/office/drawing/2014/main" id="{C8B9788F-DBB2-F7A3-643D-D42ED101F9C5}"/>
+              </a:ext>
+            </a:extLst>
+          </p:cNvPr>
+          <p:cNvSpPr txBox="1"/>
+          <p:nvPr/>
+        </p:nvSpPr>
+        <p:spPr>
+          <a:xfrm>
+            <a:off x="4891334" y="960141"/>
+            <a:ext cx="3138615" cy="3139321"/>
+          </a:xfrm>
+          <a:prstGeom prst="rect">
+            <a:avLst/>
+          </a:prstGeom>
+          <a:noFill/>
+          <a:ln w="38100" cap="flat" cmpd="sng">
+            <a:solidFill>
+              <a:schemeClr val="tx1"/>
+            </a:solidFill>
+            <a:prstDash val="solid"/>
+          </a:ln>
+        </p:spPr>
+        <p:txBody>
+          <a:bodyPr wrap="square" rtlCol="0">
+            <a:spAutoFit/>
+          </a:bodyPr>
+          <a:lstStyle/>
+          <a:p>
+            <a:pPr marL="285750" indent="-285750">
+              <a:buFont typeface="Arial" panose="020B0604020202020204" pitchFamily="34" charset="0"/>
+              <a:buChar char="•"/>
+            </a:pPr>
+            <a:r>
+              <a:rPr lang="en-ID" dirty="0">
+                <a:solidFill>
+                  <a:schemeClr val="bg1"/>
+                </a:solidFill>
+                <a:latin typeface="Calibri" panose="020F0502020204030204" pitchFamily="34" charset="0"/>
+                <a:ea typeface="Calibri" panose="020F0502020204030204" pitchFamily="34" charset="0"/>
+                <a:cs typeface="Times New Roman" panose="02020603050405020304" pitchFamily="18" charset="0"/>
+              </a:rPr>
+              <a:t>Mouse-Aim Grapple</a:t>
+            </a:r>
+          </a:p>
+          <a:p>
+            <a:pPr marL="285750" indent="-285750">
+              <a:buFont typeface="Arial" panose="020B0604020202020204" pitchFamily="34" charset="0"/>
+              <a:buChar char="•"/>
+            </a:pPr>
+            <a:r>
+              <a:rPr lang="en-ID" dirty="0">
+                <a:solidFill>
+                  <a:schemeClr val="bg1"/>
+                </a:solidFill>
+                <a:latin typeface="Calibri" panose="020F0502020204030204" pitchFamily="34" charset="0"/>
+                <a:ea typeface="Calibri" panose="020F0502020204030204" pitchFamily="34" charset="0"/>
+                <a:cs typeface="Times New Roman" panose="02020603050405020304" pitchFamily="18" charset="0"/>
+              </a:rPr>
+              <a:t>Additional Puzzles:</a:t>
+            </a:r>
+          </a:p>
+          <a:p>
+            <a:pPr marL="742950" lvl="1" indent="-285750">
+              <a:buFont typeface="Arial" panose="020B0604020202020204" pitchFamily="34" charset="0"/>
+              <a:buChar char="•"/>
+            </a:pPr>
+            <a:r>
+              <a:rPr lang="en-ID" dirty="0">
+                <a:solidFill>
+                  <a:schemeClr val="bg1"/>
+                </a:solidFill>
+                <a:latin typeface="Calibri" panose="020F0502020204030204" pitchFamily="34" charset="0"/>
+                <a:ea typeface="Calibri" panose="020F0502020204030204" pitchFamily="34" charset="0"/>
+                <a:cs typeface="Times New Roman" panose="02020603050405020304" pitchFamily="18" charset="0"/>
+              </a:rPr>
+              <a:t>Lasers</a:t>
+            </a:r>
+          </a:p>
+          <a:p>
+            <a:pPr marL="742950" lvl="1" indent="-285750">
+              <a:buFont typeface="Arial" panose="020B0604020202020204" pitchFamily="34" charset="0"/>
+              <a:buChar char="•"/>
+            </a:pPr>
+            <a:r>
+              <a:rPr lang="en-ID" dirty="0">
+                <a:solidFill>
+                  <a:schemeClr val="bg1"/>
+                </a:solidFill>
+                <a:latin typeface="Calibri" panose="020F0502020204030204" pitchFamily="34" charset="0"/>
+                <a:ea typeface="Calibri" panose="020F0502020204030204" pitchFamily="34" charset="0"/>
+                <a:cs typeface="Times New Roman" panose="02020603050405020304" pitchFamily="18" charset="0"/>
+              </a:rPr>
+              <a:t>Boxes</a:t>
+            </a:r>
+          </a:p>
+          <a:p>
+            <a:pPr marL="742950" lvl="1" indent="-285750">
+              <a:buFont typeface="Arial" panose="020B0604020202020204" pitchFamily="34" charset="0"/>
+              <a:buChar char="•"/>
+            </a:pPr>
+            <a:r>
+              <a:rPr lang="en-ID" dirty="0">
+                <a:solidFill>
+                  <a:schemeClr val="bg1"/>
+                </a:solidFill>
+                <a:latin typeface="Calibri" panose="020F0502020204030204" pitchFamily="34" charset="0"/>
+                <a:ea typeface="Calibri" panose="020F0502020204030204" pitchFamily="34" charset="0"/>
+                <a:cs typeface="Times New Roman" panose="02020603050405020304" pitchFamily="18" charset="0"/>
+              </a:rPr>
+              <a:t>Buttons</a:t>
+            </a:r>
+          </a:p>
+          <a:p>
+            <a:pPr marL="742950" lvl="1" indent="-285750">
+              <a:buFont typeface="Arial" panose="020B0604020202020204" pitchFamily="34" charset="0"/>
+              <a:buChar char="•"/>
+            </a:pPr>
+            <a:r>
+              <a:rPr lang="en-ID" dirty="0">
+                <a:solidFill>
+                  <a:schemeClr val="bg1"/>
+                </a:solidFill>
+                <a:latin typeface="Calibri" panose="020F0502020204030204" pitchFamily="34" charset="0"/>
+                <a:ea typeface="Calibri" panose="020F0502020204030204" pitchFamily="34" charset="0"/>
+                <a:cs typeface="Times New Roman" panose="02020603050405020304" pitchFamily="18" charset="0"/>
+              </a:rPr>
+              <a:t>Switches</a:t>
+            </a:r>
+          </a:p>
+          <a:p>
+            <a:pPr marL="742950" lvl="1" indent="-285750">
+              <a:buFont typeface="Arial" panose="020B0604020202020204" pitchFamily="34" charset="0"/>
+              <a:buChar char="•"/>
+            </a:pPr>
+            <a:r>
+              <a:rPr lang="en-ID" dirty="0">
+                <a:solidFill>
+                  <a:schemeClr val="bg1"/>
+                </a:solidFill>
+                <a:latin typeface="Calibri" panose="020F0502020204030204" pitchFamily="34" charset="0"/>
+                <a:ea typeface="Calibri" panose="020F0502020204030204" pitchFamily="34" charset="0"/>
+                <a:cs typeface="Times New Roman" panose="02020603050405020304" pitchFamily="18" charset="0"/>
+              </a:rPr>
+              <a:t>Timed-Doors</a:t>
+            </a:r>
+          </a:p>
+          <a:p>
+            <a:pPr marL="742950" lvl="1" indent="-285750">
+              <a:buFont typeface="Arial" panose="020B0604020202020204" pitchFamily="34" charset="0"/>
+              <a:buChar char="•"/>
+            </a:pPr>
+            <a:r>
+              <a:rPr lang="en-ID" dirty="0">
+                <a:solidFill>
+                  <a:schemeClr val="bg1"/>
+                </a:solidFill>
+                <a:latin typeface="Calibri" panose="020F0502020204030204" pitchFamily="34" charset="0"/>
+                <a:ea typeface="Calibri" panose="020F0502020204030204" pitchFamily="34" charset="0"/>
+                <a:cs typeface="Times New Roman" panose="02020603050405020304" pitchFamily="18" charset="0"/>
+              </a:rPr>
+              <a:t>Keys</a:t>
+            </a:r>
+          </a:p>
+          <a:p>
+            <a:pPr marL="285750" indent="-285750">
+              <a:buFont typeface="Arial" panose="020B0604020202020204" pitchFamily="34" charset="0"/>
+              <a:buChar char="•"/>
+            </a:pPr>
+            <a:r>
+              <a:rPr lang="en-ID" dirty="0">
+                <a:solidFill>
+                  <a:schemeClr val="bg1"/>
+                </a:solidFill>
+                <a:latin typeface="Calibri" panose="020F0502020204030204" pitchFamily="34" charset="0"/>
+                <a:cs typeface="Times New Roman" panose="02020603050405020304" pitchFamily="18" charset="0"/>
+              </a:rPr>
+              <a:t>Additional Enemies</a:t>
+            </a:r>
+          </a:p>
+          <a:p>
+            <a:pPr marL="285750" indent="-285750">
+              <a:buFont typeface="Arial" panose="020B0604020202020204" pitchFamily="34" charset="0"/>
+              <a:buChar char="•"/>
+            </a:pPr>
+            <a:r>
+              <a:rPr lang="en-ID" dirty="0">
+                <a:solidFill>
+                  <a:schemeClr val="bg1"/>
+                </a:solidFill>
+                <a:latin typeface="Calibri" panose="020F0502020204030204" pitchFamily="34" charset="0"/>
+                <a:cs typeface="Times New Roman" panose="02020603050405020304" pitchFamily="18" charset="0"/>
+              </a:rPr>
+              <a:t>Shield</a:t>
+            </a:r>
+          </a:p>
+          <a:p>
+            <a:pPr marL="285750" indent="-285750">
+              <a:buFont typeface="Arial" panose="020B0604020202020204" pitchFamily="34" charset="0"/>
+              <a:buChar char="•"/>
+            </a:pPr>
+            <a:r>
+              <a:rPr lang="en-ID" dirty="0">
+                <a:solidFill>
+                  <a:schemeClr val="bg1"/>
+                </a:solidFill>
+                <a:latin typeface="Calibri" panose="020F0502020204030204" pitchFamily="34" charset="0"/>
+                <a:cs typeface="Times New Roman" panose="02020603050405020304" pitchFamily="18" charset="0"/>
+              </a:rPr>
+              <a:t>Sword</a:t>
+            </a:r>
+          </a:p>
+        </p:txBody>
+      </p:sp>
+      <p:sp>
+        <p:nvSpPr>
+          <p:cNvPr id="12" name="TextBox 11">
+            <a:extLst>
+              <a:ext uri="{FF2B5EF4-FFF2-40B4-BE49-F238E27FC236}">
+                <a16:creationId xmlns:a16="http://schemas.microsoft.com/office/drawing/2014/main" id="{9F1B3F66-8BD3-9071-EC87-2E08F03D61D4}"/>
+              </a:ext>
+            </a:extLst>
+          </p:cNvPr>
+          <p:cNvSpPr txBox="1"/>
+          <p:nvPr/>
+        </p:nvSpPr>
+        <p:spPr>
+          <a:xfrm>
+            <a:off x="4891334" y="4679978"/>
+            <a:ext cx="3138615" cy="923330"/>
+          </a:xfrm>
+          <a:prstGeom prst="rect">
+            <a:avLst/>
+          </a:prstGeom>
+          <a:noFill/>
+          <a:ln w="38100" cap="flat" cmpd="sng">
+            <a:solidFill>
+              <a:schemeClr val="tx1"/>
+            </a:solidFill>
+            <a:prstDash val="solid"/>
+          </a:ln>
+        </p:spPr>
+        <p:txBody>
+          <a:bodyPr wrap="square" rtlCol="0">
+            <a:spAutoFit/>
+          </a:bodyPr>
+          <a:lstStyle/>
+          <a:p>
+            <a:pPr marL="285750" indent="-285750">
+              <a:buFont typeface="Arial" panose="020B0604020202020204" pitchFamily="34" charset="0"/>
+              <a:buChar char="•"/>
+            </a:pPr>
+            <a:r>
+              <a:rPr lang="en-ID" dirty="0">
+                <a:solidFill>
+                  <a:schemeClr val="bg1"/>
+                </a:solidFill>
+                <a:latin typeface="Calibri" panose="020F0502020204030204" pitchFamily="34" charset="0"/>
+                <a:ea typeface="Calibri" panose="020F0502020204030204" pitchFamily="34" charset="0"/>
+                <a:cs typeface="Times New Roman" panose="02020603050405020304" pitchFamily="18" charset="0"/>
+              </a:rPr>
+              <a:t>Different uses for the grapple</a:t>
+            </a:r>
+          </a:p>
+          <a:p>
+            <a:pPr marL="285750" indent="-285750">
+              <a:buFont typeface="Arial" panose="020B0604020202020204" pitchFamily="34" charset="0"/>
+              <a:buChar char="•"/>
+            </a:pPr>
+            <a:r>
+              <a:rPr lang="en-ID" dirty="0">
+                <a:solidFill>
+                  <a:schemeClr val="bg1"/>
+                </a:solidFill>
+                <a:latin typeface="Calibri" panose="020F0502020204030204" pitchFamily="34" charset="0"/>
+                <a:ea typeface="Calibri" panose="020F0502020204030204" pitchFamily="34" charset="0"/>
+                <a:cs typeface="Times New Roman" panose="02020603050405020304" pitchFamily="18" charset="0"/>
+              </a:rPr>
+              <a:t>Variety in gameplay</a:t>
+            </a:r>
+          </a:p>
+        </p:txBody>
+      </p:sp>
+      <p:pic>
+        <p:nvPicPr>
+          <p:cNvPr id="14" name="Picture 13" descr="A picture containing screenshot, cartoon, 3d modeling, video game software&#10;&#10;Description automatically generated">
+            <a:extLst>
+              <a:ext uri="{FF2B5EF4-FFF2-40B4-BE49-F238E27FC236}">
+                <a16:creationId xmlns:a16="http://schemas.microsoft.com/office/drawing/2014/main" id="{B11E7E7F-2623-3F81-1846-D1B86226451A}"/>
+              </a:ext>
+            </a:extLst>
+          </p:cNvPr>
+          <p:cNvPicPr>
+            <a:picLocks noChangeAspect="1"/>
+          </p:cNvPicPr>
+          <p:nvPr/>
+        </p:nvPicPr>
+        <p:blipFill>
+          <a:blip r:embed="rId6">
+            <a:extLst>
+              <a:ext uri="{28A0092B-C50C-407E-A947-70E740481C1C}">
+                <a14:useLocalDpi xmlns:a14="http://schemas.microsoft.com/office/drawing/2010/main" val="0"/>
+              </a:ext>
+            </a:extLst>
+          </a:blip>
+          <a:stretch>
+            <a:fillRect/>
+          </a:stretch>
+        </p:blipFill>
+        <p:spPr>
+          <a:xfrm>
+            <a:off x="8312531" y="960141"/>
+            <a:ext cx="2810427" cy="1933574"/>
+          </a:xfrm>
+          <a:prstGeom prst="rect">
+            <a:avLst/>
+          </a:prstGeom>
+          <a:ln w="38100">
+            <a:solidFill>
+              <a:schemeClr val="tx1"/>
+            </a:solidFill>
+          </a:ln>
+        </p:spPr>
+      </p:pic>
+    </p:spTree>
+    <p:extLst>
+      <p:ext uri="{BB962C8B-B14F-4D97-AF65-F5344CB8AC3E}">
+        <p14:creationId xmlns:p14="http://schemas.microsoft.com/office/powerpoint/2010/main" val="1840781099"/>
+      </p:ext>
+    </p:extLst>
+  </p:cSld>
+  <p:clrMapOvr>
+    <a:masterClrMapping/>
+  </p:clrMapOvr>
+</p:sld>
+</file>
+
+<file path=ppt/slides/slide12.xml><?xml version="1.0" encoding="utf-8"?>
+<p:sld xmlns:a="http://schemas.openxmlformats.org/drawingml/2006/main" xmlns:r="http://schemas.openxmlformats.org/officeDocument/2006/relationships" xmlns:p="http://schemas.openxmlformats.org/presentationml/2006/main">
+  <p:cSld>
+    <p:spTree>
+      <p:nvGrpSpPr>
+        <p:cNvPr id="1" name=""/>
+        <p:cNvGrpSpPr/>
+        <p:nvPr/>
+      </p:nvGrpSpPr>
+      <p:grpSpPr>
+        <a:xfrm>
+          <a:off x="0" y="0"/>
+          <a:ext cx="0" cy="0"/>
+          <a:chOff x="0" y="0"/>
+          <a:chExt cx="0" cy="0"/>
+        </a:xfrm>
+      </p:grpSpPr>
+      <p:pic>
+        <p:nvPicPr>
+          <p:cNvPr id="7" name="Picture 6">
+            <a:extLst>
+              <a:ext uri="{FF2B5EF4-FFF2-40B4-BE49-F238E27FC236}">
+                <a16:creationId xmlns:a16="http://schemas.microsoft.com/office/drawing/2014/main" id="{78237A99-75C5-4EF5-B354-0898BAC45332}"/>
+              </a:ext>
+            </a:extLst>
+          </p:cNvPr>
+          <p:cNvPicPr>
+            <a:picLocks noChangeAspect="1"/>
+          </p:cNvPicPr>
+          <p:nvPr/>
+        </p:nvPicPr>
+        <p:blipFill>
+          <a:blip r:embed="rId3">
+            <a:extLst>
+              <a:ext uri="{28A0092B-C50C-407E-A947-70E740481C1C}">
+                <a14:useLocalDpi xmlns:a14="http://schemas.microsoft.com/office/drawing/2010/main" val="0"/>
+              </a:ext>
+            </a:extLst>
+          </a:blip>
+          <a:stretch>
+            <a:fillRect/>
+          </a:stretch>
+        </p:blipFill>
+        <p:spPr>
+          <a:xfrm>
             <a:off x="-101091" y="-8238"/>
             <a:ext cx="12478068" cy="6866238"/>
           </a:xfrm>
@@ -5300,26 +5878,6 @@
           <a:p>
             <a:pPr algn="ctr"/>
             <a:r>
-              <a:rPr lang="en-ID" sz="3200">
-                <a:solidFill>
-                  <a:schemeClr val="bg1"/>
-                </a:solidFill>
-                <a:latin typeface="Calibri" panose="020F0502020204030204" pitchFamily="34" charset="0"/>
-                <a:cs typeface="Times New Roman" panose="02020603050405020304" pitchFamily="18" charset="0"/>
-              </a:rPr>
-              <a:t>Josh #21018241</a:t>
-            </a:r>
-            <a:endParaRPr lang="en-ID" sz="3200" dirty="0">
-              <a:solidFill>
-                <a:schemeClr val="bg1"/>
-              </a:solidFill>
-              <a:latin typeface="Calibri" panose="020F0502020204030204" pitchFamily="34" charset="0"/>
-              <a:cs typeface="Times New Roman" panose="02020603050405020304" pitchFamily="18" charset="0"/>
-            </a:endParaRPr>
-          </a:p>
-          <a:p>
-            <a:pPr algn="ctr"/>
-            <a:r>
               <a:rPr lang="en-ID" sz="3200" dirty="0">
                 <a:solidFill>
                   <a:schemeClr val="bg1"/>
@@ -5327,7 +5885,20 @@
                 <a:latin typeface="Calibri" panose="020F0502020204030204" pitchFamily="34" charset="0"/>
                 <a:cs typeface="Times New Roman" panose="02020603050405020304" pitchFamily="18" charset="0"/>
               </a:rPr>
-              <a:t>Helen #</a:t>
+              <a:t>Josh Anderson #21018241</a:t>
+            </a:r>
+          </a:p>
+          <a:p>
+            <a:pPr algn="ctr"/>
+            <a:r>
+              <a:rPr lang="en-ID" sz="3200" dirty="0">
+                <a:solidFill>
+                  <a:schemeClr val="bg1"/>
+                </a:solidFill>
+                <a:latin typeface="Calibri" panose="020F0502020204030204" pitchFamily="34" charset="0"/>
+                <a:cs typeface="Times New Roman" panose="02020603050405020304" pitchFamily="18" charset="0"/>
+              </a:rPr>
+              <a:t>Helen McCartney #20023665</a:t>
             </a:r>
           </a:p>
           <a:p>

</xml_diff>

<commit_message>
Update Hookshot Heroes Presentation.pptx
</commit_message>
<xml_diff>
--- a/presentation/Hookshot Heroes Presentation.pptx
+++ b/presentation/Hookshot Heroes Presentation.pptx
@@ -1230,7 +1230,7 @@
           <a:p>
             <a:r>
               <a:rPr lang="en-US" dirty="0"/>
-              <a:t>Voiceover: The dungeons are not just full of treasure, but also foul creatures. Throughout the journey, Lidia and Shura and Avalon will encounter a range of creatures that that will need to defend themselves against. The </a:t>
+              <a:t>Voiceover: The dungeons are not just full of treasure, but also foul creatures. Throughout your journey, you’ll encounter a range of creatures that you will need to defend yourself against. Enemies you’ll find throughout the dungeon are the flying terror and skeletal warriors, with the powerful brute that is the minotaur and wizard that you’ll encounter as bosses; the </a:t>
             </a:r>
             <a:r>
               <a:rPr lang="en-US" dirty="0" err="1"/>
@@ -1238,7 +1238,7 @@
             </a:r>
             <a:r>
               <a:rPr lang="en-US" dirty="0"/>
-              <a:t> will provide protection and allow Lidia and Shura the ability to defeat these enemies!</a:t>
+              <a:t> will become an invaluable weapon in defeating the enemies you encounter throughout your perilous journey.</a:t>
             </a:r>
             <a:endParaRPr lang="en-ID" dirty="0"/>
           </a:p>
@@ -1326,7 +1326,7 @@
           <a:p>
             <a:r>
               <a:rPr lang="en-US" dirty="0"/>
-              <a:t>Voiceover: The dungeons are full of items that will hurt or help the explores. In order to complete the adventure with the highest score, collecting these items are key. Though some maybe slightly out of reach, or off the beaten tracking, taking a moment to map out a path to them, will result in a greater score. </a:t>
+              <a:t>Voiceover: The dungeons are full of items that will hurt or help intrepid explores. In order to complete the adventure with the highest score, collecting these items are key. Though some may slightly be out of reach, or become a hazard if not careful. Effective planning and use of the grapplehook will clear the path, as well as grab hard to reach treasure, resulting in a higher score.</a:t>
             </a:r>
             <a:endParaRPr lang="en-ID" dirty="0"/>
           </a:p>

</xml_diff>